<commit_message>
Fin Diaporama + changement reset slider
</commit_message>
<xml_diff>
--- a/Rendu/Présentation Patoune.pptx
+++ b/Rendu/Présentation Patoune.pptx
@@ -5,13 +5,14 @@
     <p:sldMasterId id="2147483648" r:id="rId1"/>
   </p:sldMasterIdLst>
   <p:notesMasterIdLst>
-    <p:notesMasterId r:id="rId6"/>
+    <p:notesMasterId r:id="rId7"/>
   </p:notesMasterIdLst>
   <p:sldIdLst>
     <p:sldId id="256" r:id="rId2"/>
     <p:sldId id="257" r:id="rId3"/>
     <p:sldId id="258" r:id="rId4"/>
     <p:sldId id="259" r:id="rId5"/>
+    <p:sldId id="260" r:id="rId6"/>
   </p:sldIdLst>
   <p:sldSz cx="9144000" cy="5143500" type="screen16x9"/>
   <p:notesSz cx="6858000" cy="9144000"/>
@@ -3802,7 +3803,7 @@
         </p:blipFill>
         <p:spPr bwMode="auto">
           <a:xfrm>
-            <a:off x="597237" y="1707654"/>
+            <a:off x="467544" y="1563638"/>
             <a:ext cx="3403164" cy="2137027"/>
           </a:xfrm>
           <a:prstGeom prst="rect">
@@ -3843,8 +3844,49 @@
         </p:blipFill>
         <p:spPr bwMode="auto">
           <a:xfrm>
-            <a:off x="5220072" y="1635646"/>
+            <a:off x="5615835" y="1419622"/>
             <a:ext cx="2867169" cy="1612782"/>
+          </a:xfrm>
+          <a:prstGeom prst="rect">
+            <a:avLst/>
+          </a:prstGeom>
+          <a:noFill/>
+          <a:extLst>
+            <a:ext uri="{909E8E84-426E-40DD-AFC4-6F175D3DCCD1}">
+              <a14:hiddenFill xmlns:a14="http://schemas.microsoft.com/office/drawing/2010/main">
+                <a:solidFill>
+                  <a:srgbClr val="FFFFFF"/>
+                </a:solidFill>
+              </a14:hiddenFill>
+            </a:ext>
+          </a:extLst>
+        </p:spPr>
+      </p:pic>
+      <p:pic>
+        <p:nvPicPr>
+          <p:cNvPr id="1028" name="Picture 4" descr="C:\Users\David\Documents\GitHub\VisionIndustriel\Rendu\aide.png"/>
+          <p:cNvPicPr>
+            <a:picLocks noChangeAspect="1" noChangeArrowheads="1"/>
+          </p:cNvPicPr>
+          <p:nvPr/>
+        </p:nvPicPr>
+        <p:blipFill>
+          <a:blip r:embed="rId5">
+            <a:extLst>
+              <a:ext uri="{28A0092B-C50C-407E-A947-70E740481C1C}">
+                <a14:useLocalDpi xmlns:a14="http://schemas.microsoft.com/office/drawing/2010/main" val="0"/>
+              </a:ext>
+            </a:extLst>
+          </a:blip>
+          <a:srcRect/>
+          <a:stretch>
+            <a:fillRect/>
+          </a:stretch>
+        </p:blipFill>
+        <p:spPr bwMode="auto">
+          <a:xfrm>
+            <a:off x="4283968" y="3302868"/>
+            <a:ext cx="3219475" cy="1734973"/>
           </a:xfrm>
           <a:prstGeom prst="rect">
             <a:avLst/>
@@ -3871,6 +3913,18 @@
   <p:clrMapOvr>
     <a:masterClrMapping/>
   </p:clrMapOvr>
+  <mc:AlternateContent xmlns:mc="http://schemas.openxmlformats.org/markup-compatibility/2006">
+    <mc:Choice xmlns:p14="http://schemas.microsoft.com/office/powerpoint/2010/main" Requires="p14">
+      <p:transition spd="slow" p14:dur="1400">
+        <p14:ripple/>
+      </p:transition>
+    </mc:Choice>
+    <mc:Fallback>
+      <p:transition spd="slow">
+        <p:fade/>
+      </p:transition>
+    </mc:Fallback>
+  </mc:AlternateContent>
   <p:timing>
     <p:tnLst>
       <p:par>
@@ -4147,6 +4201,114 @@
           <a:chExt cx="0" cy="0"/>
         </a:xfrm>
       </p:grpSpPr>
+      <p:pic>
+        <p:nvPicPr>
+          <p:cNvPr id="3074" name="Picture 2"/>
+          <p:cNvPicPr>
+            <a:picLocks noChangeAspect="1" noChangeArrowheads="1"/>
+          </p:cNvPicPr>
+          <p:nvPr/>
+        </p:nvPicPr>
+        <p:blipFill>
+          <a:blip r:embed="rId2">
+            <a:extLst>
+              <a:ext uri="{28A0092B-C50C-407E-A947-70E740481C1C}">
+                <a14:useLocalDpi xmlns:a14="http://schemas.microsoft.com/office/drawing/2010/main" val="0"/>
+              </a:ext>
+            </a:extLst>
+          </a:blip>
+          <a:srcRect/>
+          <a:stretch>
+            <a:fillRect/>
+          </a:stretch>
+        </p:blipFill>
+        <p:spPr bwMode="auto">
+          <a:xfrm>
+            <a:off x="35198" y="843558"/>
+            <a:ext cx="4494687" cy="2822451"/>
+          </a:xfrm>
+          <a:prstGeom prst="rect">
+            <a:avLst/>
+          </a:prstGeom>
+          <a:noFill/>
+          <a:ln>
+            <a:noFill/>
+          </a:ln>
+          <a:extLst>
+            <a:ext uri="{909E8E84-426E-40DD-AFC4-6F175D3DCCD1}">
+              <a14:hiddenFill xmlns:a14="http://schemas.microsoft.com/office/drawing/2010/main">
+                <a:solidFill>
+                  <a:schemeClr val="accent1"/>
+                </a:solidFill>
+              </a14:hiddenFill>
+            </a:ext>
+            <a:ext uri="{91240B29-F687-4F45-9708-019B960494DF}">
+              <a14:hiddenLine xmlns:a14="http://schemas.microsoft.com/office/drawing/2010/main" w="9525">
+                <a:solidFill>
+                  <a:schemeClr val="tx1"/>
+                </a:solidFill>
+                <a:miter lim="800000"/>
+                <a:headEnd/>
+                <a:tailEnd/>
+              </a14:hiddenLine>
+            </a:ext>
+          </a:extLst>
+        </p:spPr>
+      </p:pic>
+      <p:pic>
+        <p:nvPicPr>
+          <p:cNvPr id="3075" name="Picture 3"/>
+          <p:cNvPicPr>
+            <a:picLocks noChangeAspect="1" noChangeArrowheads="1"/>
+          </p:cNvPicPr>
+          <p:nvPr/>
+        </p:nvPicPr>
+        <p:blipFill>
+          <a:blip r:embed="rId3">
+            <a:extLst>
+              <a:ext uri="{28A0092B-C50C-407E-A947-70E740481C1C}">
+                <a14:useLocalDpi xmlns:a14="http://schemas.microsoft.com/office/drawing/2010/main" val="0"/>
+              </a:ext>
+            </a:extLst>
+          </a:blip>
+          <a:srcRect/>
+          <a:stretch>
+            <a:fillRect/>
+          </a:stretch>
+        </p:blipFill>
+        <p:spPr bwMode="auto">
+          <a:xfrm>
+            <a:off x="4598638" y="2139702"/>
+            <a:ext cx="4380014" cy="2750442"/>
+          </a:xfrm>
+          <a:prstGeom prst="rect">
+            <a:avLst/>
+          </a:prstGeom>
+          <a:noFill/>
+          <a:ln>
+            <a:noFill/>
+          </a:ln>
+          <a:extLst>
+            <a:ext uri="{909E8E84-426E-40DD-AFC4-6F175D3DCCD1}">
+              <a14:hiddenFill xmlns:a14="http://schemas.microsoft.com/office/drawing/2010/main">
+                <a:solidFill>
+                  <a:schemeClr val="accent1"/>
+                </a:solidFill>
+              </a14:hiddenFill>
+            </a:ext>
+            <a:ext uri="{91240B29-F687-4F45-9708-019B960494DF}">
+              <a14:hiddenLine xmlns:a14="http://schemas.microsoft.com/office/drawing/2010/main" w="9525">
+                <a:solidFill>
+                  <a:schemeClr val="tx1"/>
+                </a:solidFill>
+                <a:miter lim="800000"/>
+                <a:headEnd/>
+                <a:tailEnd/>
+              </a14:hiddenLine>
+            </a:ext>
+          </a:extLst>
+        </p:spPr>
+      </p:pic>
     </p:spTree>
     <p:extLst>
       <p:ext uri="{BB962C8B-B14F-4D97-AF65-F5344CB8AC3E}">
@@ -4184,10 +4346,278 @@
           <a:chExt cx="0" cy="0"/>
         </a:xfrm>
       </p:grpSpPr>
+      <p:pic>
+        <p:nvPicPr>
+          <p:cNvPr id="4098" name="Picture 2"/>
+          <p:cNvPicPr>
+            <a:picLocks noChangeAspect="1" noChangeArrowheads="1"/>
+          </p:cNvPicPr>
+          <p:nvPr/>
+        </p:nvPicPr>
+        <p:blipFill>
+          <a:blip r:embed="rId2">
+            <a:extLst>
+              <a:ext uri="{28A0092B-C50C-407E-A947-70E740481C1C}">
+                <a14:useLocalDpi xmlns:a14="http://schemas.microsoft.com/office/drawing/2010/main" val="0"/>
+              </a:ext>
+            </a:extLst>
+          </a:blip>
+          <a:srcRect/>
+          <a:stretch>
+            <a:fillRect/>
+          </a:stretch>
+        </p:blipFill>
+        <p:spPr bwMode="auto">
+          <a:xfrm>
+            <a:off x="449040" y="1275606"/>
+            <a:ext cx="4838700" cy="3038475"/>
+          </a:xfrm>
+          <a:prstGeom prst="rect">
+            <a:avLst/>
+          </a:prstGeom>
+          <a:noFill/>
+          <a:ln>
+            <a:noFill/>
+          </a:ln>
+          <a:extLst>
+            <a:ext uri="{909E8E84-426E-40DD-AFC4-6F175D3DCCD1}">
+              <a14:hiddenFill xmlns:a14="http://schemas.microsoft.com/office/drawing/2010/main">
+                <a:solidFill>
+                  <a:schemeClr val="accent1"/>
+                </a:solidFill>
+              </a14:hiddenFill>
+            </a:ext>
+            <a:ext uri="{91240B29-F687-4F45-9708-019B960494DF}">
+              <a14:hiddenLine xmlns:a14="http://schemas.microsoft.com/office/drawing/2010/main" w="9525">
+                <a:solidFill>
+                  <a:schemeClr val="tx1"/>
+                </a:solidFill>
+                <a:miter lim="800000"/>
+                <a:headEnd/>
+                <a:tailEnd/>
+              </a14:hiddenLine>
+            </a:ext>
+          </a:extLst>
+        </p:spPr>
+      </p:pic>
+      <p:pic>
+        <p:nvPicPr>
+          <p:cNvPr id="4100" name="Picture 4" descr="C:\Users\David\Documents\GitHub\VisionIndustriel\VI_Empreintes\Resources\DataBaseTrack\Chat.png"/>
+          <p:cNvPicPr>
+            <a:picLocks noChangeAspect="1" noChangeArrowheads="1"/>
+          </p:cNvPicPr>
+          <p:nvPr/>
+        </p:nvPicPr>
+        <p:blipFill>
+          <a:blip r:embed="rId3">
+            <a:extLst>
+              <a:ext uri="{28A0092B-C50C-407E-A947-70E740481C1C}">
+                <a14:useLocalDpi xmlns:a14="http://schemas.microsoft.com/office/drawing/2010/main" val="0"/>
+              </a:ext>
+            </a:extLst>
+          </a:blip>
+          <a:srcRect/>
+          <a:stretch>
+            <a:fillRect/>
+          </a:stretch>
+        </p:blipFill>
+        <p:spPr bwMode="auto">
+          <a:xfrm>
+            <a:off x="6300192" y="1347614"/>
+            <a:ext cx="2159000" cy="2540000"/>
+          </a:xfrm>
+          <a:prstGeom prst="rect">
+            <a:avLst/>
+          </a:prstGeom>
+          <a:noFill/>
+          <a:extLst>
+            <a:ext uri="{909E8E84-426E-40DD-AFC4-6F175D3DCCD1}">
+              <a14:hiddenFill xmlns:a14="http://schemas.microsoft.com/office/drawing/2010/main">
+                <a:solidFill>
+                  <a:srgbClr val="FFFFFF"/>
+                </a:solidFill>
+              </a14:hiddenFill>
+            </a:ext>
+          </a:extLst>
+        </p:spPr>
+      </p:pic>
     </p:spTree>
     <p:extLst>
       <p:ext uri="{BB962C8B-B14F-4D97-AF65-F5344CB8AC3E}">
         <p14:creationId xmlns:p14="http://schemas.microsoft.com/office/powerpoint/2010/main" val="3847626594"/>
+      </p:ext>
+    </p:extLst>
+  </p:cSld>
+  <p:clrMapOvr>
+    <a:masterClrMapping/>
+  </p:clrMapOvr>
+  <p:timing>
+    <p:tnLst>
+      <p:par>
+        <p:cTn id="1" dur="indefinite" restart="never" nodeType="tmRoot"/>
+      </p:par>
+    </p:tnLst>
+  </p:timing>
+</p:sld>
+</file>
+
+<file path=ppt/slides/slide5.xml><?xml version="1.0" encoding="utf-8"?>
+<p:sld xmlns:a="http://schemas.openxmlformats.org/drawingml/2006/main" xmlns:r="http://schemas.openxmlformats.org/officeDocument/2006/relationships" xmlns:p="http://schemas.openxmlformats.org/presentationml/2006/main">
+  <p:cSld>
+    <p:spTree>
+      <p:nvGrpSpPr>
+        <p:cNvPr id="1" name=""/>
+        <p:cNvGrpSpPr/>
+        <p:nvPr/>
+      </p:nvGrpSpPr>
+      <p:grpSpPr>
+        <a:xfrm>
+          <a:off x="0" y="0"/>
+          <a:ext cx="0" cy="0"/>
+          <a:chOff x="0" y="0"/>
+          <a:chExt cx="0" cy="0"/>
+        </a:xfrm>
+      </p:grpSpPr>
+      <p:pic>
+        <p:nvPicPr>
+          <p:cNvPr id="5122" name="Picture 2" descr="C:\Users\David\Documents\GitHub\VisionIndustriel\VI_Empreintes\Resources\DataBaseTrack\Lynx.png"/>
+          <p:cNvPicPr>
+            <a:picLocks noChangeAspect="1" noChangeArrowheads="1"/>
+          </p:cNvPicPr>
+          <p:nvPr/>
+        </p:nvPicPr>
+        <p:blipFill>
+          <a:blip r:embed="rId2">
+            <a:extLst>
+              <a:ext uri="{28A0092B-C50C-407E-A947-70E740481C1C}">
+                <a14:useLocalDpi xmlns:a14="http://schemas.microsoft.com/office/drawing/2010/main" val="0"/>
+              </a:ext>
+            </a:extLst>
+          </a:blip>
+          <a:srcRect/>
+          <a:stretch>
+            <a:fillRect/>
+          </a:stretch>
+        </p:blipFill>
+        <p:spPr bwMode="auto">
+          <a:xfrm>
+            <a:off x="6444208" y="1589782"/>
+            <a:ext cx="1754788" cy="2064456"/>
+          </a:xfrm>
+          <a:prstGeom prst="rect">
+            <a:avLst/>
+          </a:prstGeom>
+          <a:noFill/>
+          <a:extLst>
+            <a:ext uri="{909E8E84-426E-40DD-AFC4-6F175D3DCCD1}">
+              <a14:hiddenFill xmlns:a14="http://schemas.microsoft.com/office/drawing/2010/main">
+                <a:solidFill>
+                  <a:srgbClr val="FFFFFF"/>
+                </a:solidFill>
+              </a14:hiddenFill>
+            </a:ext>
+          </a:extLst>
+        </p:spPr>
+      </p:pic>
+      <p:pic>
+        <p:nvPicPr>
+          <p:cNvPr id="5123" name="Picture 3" descr="C:\Users\David\Documents\GitHub\VisionIndustriel\VI_Empreintes\Resources\Empreintes\009.png"/>
+          <p:cNvPicPr>
+            <a:picLocks noChangeAspect="1" noChangeArrowheads="1"/>
+          </p:cNvPicPr>
+          <p:nvPr/>
+        </p:nvPicPr>
+        <p:blipFill>
+          <a:blip r:embed="rId3">
+            <a:extLst>
+              <a:ext uri="{28A0092B-C50C-407E-A947-70E740481C1C}">
+                <a14:useLocalDpi xmlns:a14="http://schemas.microsoft.com/office/drawing/2010/main" val="0"/>
+              </a:ext>
+            </a:extLst>
+          </a:blip>
+          <a:srcRect/>
+          <a:stretch>
+            <a:fillRect/>
+          </a:stretch>
+        </p:blipFill>
+        <p:spPr bwMode="auto">
+          <a:xfrm>
+            <a:off x="1043608" y="1589782"/>
+            <a:ext cx="1804937" cy="2123455"/>
+          </a:xfrm>
+          <a:prstGeom prst="rect">
+            <a:avLst/>
+          </a:prstGeom>
+          <a:noFill/>
+          <a:extLst>
+            <a:ext uri="{909E8E84-426E-40DD-AFC4-6F175D3DCCD1}">
+              <a14:hiddenFill xmlns:a14="http://schemas.microsoft.com/office/drawing/2010/main">
+                <a:solidFill>
+                  <a:srgbClr val="FFFFFF"/>
+                </a:solidFill>
+              </a14:hiddenFill>
+            </a:ext>
+          </a:extLst>
+        </p:spPr>
+      </p:pic>
+      <p:pic>
+        <p:nvPicPr>
+          <p:cNvPr id="5124" name="Picture 4"/>
+          <p:cNvPicPr>
+            <a:picLocks noChangeAspect="1" noChangeArrowheads="1"/>
+          </p:cNvPicPr>
+          <p:nvPr/>
+        </p:nvPicPr>
+        <p:blipFill>
+          <a:blip r:embed="rId4">
+            <a:extLst>
+              <a:ext uri="{28A0092B-C50C-407E-A947-70E740481C1C}">
+                <a14:useLocalDpi xmlns:a14="http://schemas.microsoft.com/office/drawing/2010/main" val="0"/>
+              </a:ext>
+            </a:extLst>
+          </a:blip>
+          <a:srcRect/>
+          <a:stretch>
+            <a:fillRect/>
+          </a:stretch>
+        </p:blipFill>
+        <p:spPr bwMode="auto">
+          <a:xfrm>
+            <a:off x="3743648" y="1684721"/>
+            <a:ext cx="1647825" cy="1933575"/>
+          </a:xfrm>
+          <a:prstGeom prst="rect">
+            <a:avLst/>
+          </a:prstGeom>
+          <a:noFill/>
+          <a:ln>
+            <a:noFill/>
+          </a:ln>
+          <a:extLst>
+            <a:ext uri="{909E8E84-426E-40DD-AFC4-6F175D3DCCD1}">
+              <a14:hiddenFill xmlns:a14="http://schemas.microsoft.com/office/drawing/2010/main">
+                <a:solidFill>
+                  <a:schemeClr val="accent1"/>
+                </a:solidFill>
+              </a14:hiddenFill>
+            </a:ext>
+            <a:ext uri="{91240B29-F687-4F45-9708-019B960494DF}">
+              <a14:hiddenLine xmlns:a14="http://schemas.microsoft.com/office/drawing/2010/main" w="9525">
+                <a:solidFill>
+                  <a:schemeClr val="tx1"/>
+                </a:solidFill>
+                <a:miter lim="800000"/>
+                <a:headEnd/>
+                <a:tailEnd/>
+              </a14:hiddenLine>
+            </a:ext>
+          </a:extLst>
+        </p:spPr>
+      </p:pic>
+    </p:spTree>
+    <p:extLst>
+      <p:ext uri="{BB962C8B-B14F-4D97-AF65-F5344CB8AC3E}">
+        <p14:creationId xmlns:p14="http://schemas.microsoft.com/office/powerpoint/2010/main" val="816175621"/>
       </p:ext>
     </p:extLst>
   </p:cSld>

</xml_diff>